<commit_message>
-Presentazione -Immagini principali utilizzate -Link utili a estensioni
</commit_message>
<xml_diff>
--- a/Presentazione_Iniziale.pptx
+++ b/Presentazione_Iniziale.pptx
@@ -6,6 +6,16 @@
   </p:sldMasterIdLst>
   <p:sldIdLst>
     <p:sldId id="256" r:id="rId2"/>
+    <p:sldId id="257" r:id="rId3"/>
+    <p:sldId id="258" r:id="rId4"/>
+    <p:sldId id="261" r:id="rId5"/>
+    <p:sldId id="265" r:id="rId6"/>
+    <p:sldId id="262" r:id="rId7"/>
+    <p:sldId id="263" r:id="rId8"/>
+    <p:sldId id="264" r:id="rId9"/>
+    <p:sldId id="259" r:id="rId10"/>
+    <p:sldId id="266" r:id="rId11"/>
+    <p:sldId id="260" r:id="rId12"/>
   </p:sldIdLst>
   <p:sldSz cx="9144000" cy="6858000" type="screen4x3"/>
   <p:notesSz cx="6858000" cy="9144000"/>
@@ -293,7 +303,7 @@
             <a:fld id="{8E36636D-D922-432D-A958-524484B5923D}" type="datetimeFigureOut">
               <a:rPr lang="en-US" smtClean="0"/>
               <a:pPr/>
-              <a:t>10/01/15</a:t>
+              <a:t>15/01/15</a:t>
             </a:fld>
             <a:endParaRPr lang="en-US"/>
           </a:p>
@@ -460,7 +470,7 @@
             <a:fld id="{8E36636D-D922-432D-A958-524484B5923D}" type="datetimeFigureOut">
               <a:rPr lang="en-US" smtClean="0"/>
               <a:pPr/>
-              <a:t>10/01/15</a:t>
+              <a:t>15/01/15</a:t>
             </a:fld>
             <a:endParaRPr lang="en-US"/>
           </a:p>
@@ -637,7 +647,7 @@
             <a:fld id="{8E36636D-D922-432D-A958-524484B5923D}" type="datetimeFigureOut">
               <a:rPr lang="en-US" smtClean="0"/>
               <a:pPr/>
-              <a:t>10/01/15</a:t>
+              <a:t>15/01/15</a:t>
             </a:fld>
             <a:endParaRPr lang="en-US"/>
           </a:p>
@@ -804,7 +814,7 @@
             <a:fld id="{8E36636D-D922-432D-A958-524484B5923D}" type="datetimeFigureOut">
               <a:rPr lang="en-US" smtClean="0"/>
               <a:pPr/>
-              <a:t>10/01/15</a:t>
+              <a:t>15/01/15</a:t>
             </a:fld>
             <a:endParaRPr lang="en-US"/>
           </a:p>
@@ -1045,7 +1055,7 @@
             <a:fld id="{8E36636D-D922-432D-A958-524484B5923D}" type="datetimeFigureOut">
               <a:rPr lang="en-US" smtClean="0"/>
               <a:pPr/>
-              <a:t>10/01/15</a:t>
+              <a:t>15/01/15</a:t>
             </a:fld>
             <a:endParaRPr lang="en-US"/>
           </a:p>
@@ -1330,7 +1340,7 @@
             <a:fld id="{8E36636D-D922-432D-A958-524484B5923D}" type="datetimeFigureOut">
               <a:rPr lang="en-US" smtClean="0"/>
               <a:pPr/>
-              <a:t>10/01/15</a:t>
+              <a:t>15/01/15</a:t>
             </a:fld>
             <a:endParaRPr lang="en-US"/>
           </a:p>
@@ -1749,7 +1759,7 @@
             <a:fld id="{8E36636D-D922-432D-A958-524484B5923D}" type="datetimeFigureOut">
               <a:rPr lang="en-US" smtClean="0"/>
               <a:pPr/>
-              <a:t>10/01/15</a:t>
+              <a:t>15/01/15</a:t>
             </a:fld>
             <a:endParaRPr lang="en-US"/>
           </a:p>
@@ -1864,7 +1874,7 @@
             <a:fld id="{8E36636D-D922-432D-A958-524484B5923D}" type="datetimeFigureOut">
               <a:rPr lang="en-US" smtClean="0"/>
               <a:pPr/>
-              <a:t>10/01/15</a:t>
+              <a:t>15/01/15</a:t>
             </a:fld>
             <a:endParaRPr lang="en-US"/>
           </a:p>
@@ -1956,7 +1966,7 @@
             <a:fld id="{8E36636D-D922-432D-A958-524484B5923D}" type="datetimeFigureOut">
               <a:rPr lang="en-US" smtClean="0"/>
               <a:pPr/>
-              <a:t>10/01/15</a:t>
+              <a:t>15/01/15</a:t>
             </a:fld>
             <a:endParaRPr lang="en-US"/>
           </a:p>
@@ -2237,7 +2247,7 @@
             <a:fld id="{8E36636D-D922-432D-A958-524484B5923D}" type="datetimeFigureOut">
               <a:rPr lang="en-US" smtClean="0"/>
               <a:pPr/>
-              <a:t>10/01/15</a:t>
+              <a:t>15/01/15</a:t>
             </a:fld>
             <a:endParaRPr lang="en-US"/>
           </a:p>
@@ -2498,7 +2508,7 @@
             <a:fld id="{8E36636D-D922-432D-A958-524484B5923D}" type="datetimeFigureOut">
               <a:rPr lang="en-US" smtClean="0"/>
               <a:pPr/>
-              <a:t>10/01/15</a:t>
+              <a:t>15/01/15</a:t>
             </a:fld>
             <a:endParaRPr lang="en-US"/>
           </a:p>
@@ -2708,7 +2718,7 @@
             <a:fld id="{8E36636D-D922-432D-A958-524484B5923D}" type="datetimeFigureOut">
               <a:rPr lang="en-US" smtClean="0"/>
               <a:pPr/>
-              <a:t>10/01/15</a:t>
+              <a:t>15/01/15</a:t>
             </a:fld>
             <a:endParaRPr lang="en-US"/>
           </a:p>
@@ -3166,10 +3176,10 @@
           <a:lstStyle/>
           <a:p>
             <a:r>
-              <a:rPr lang="it-IT" smtClean="0"/>
-              <a:t>Progetto cuore</a:t>
-            </a:r>
-            <a:endParaRPr lang="it-IT"/>
+              <a:rPr lang="it-IT" dirty="0" smtClean="0"/>
+              <a:t>Amici del cuore</a:t>
+            </a:r>
+            <a:endParaRPr lang="it-IT" dirty="0"/>
           </a:p>
         </p:txBody>
       </p:sp>
@@ -3188,7 +3198,17 @@
           <a:bodyPr/>
           <a:lstStyle/>
           <a:p>
-            <a:endParaRPr lang="it-IT"/>
+            <a:r>
+              <a:rPr lang="it-IT" dirty="0" smtClean="0"/>
+              <a:t>Presentazione demo sito</a:t>
+            </a:r>
+          </a:p>
+          <a:p>
+            <a:r>
+              <a:rPr lang="it-IT" dirty="0" smtClean="0"/>
+              <a:t>16/01/2015</a:t>
+            </a:r>
+            <a:endParaRPr lang="it-IT" dirty="0"/>
           </a:p>
         </p:txBody>
       </p:sp>
@@ -3196,6 +3216,1198 @@
     <p:extLst>
       <p:ext uri="{BB962C8B-B14F-4D97-AF65-F5344CB8AC3E}">
         <p14:creationId xmlns:p14="http://schemas.microsoft.com/office/powerpoint/2010/main" val="2068313558"/>
+      </p:ext>
+    </p:extLst>
+  </p:cSld>
+  <p:clrMapOvr>
+    <a:masterClrMapping/>
+  </p:clrMapOvr>
+</p:sld>
+</file>
+
+<file path=ppt/slides/slide10.xml><?xml version="1.0" encoding="utf-8"?>
+<p:sld xmlns:a="http://schemas.openxmlformats.org/drawingml/2006/main" xmlns:r="http://schemas.openxmlformats.org/officeDocument/2006/relationships" xmlns:p="http://schemas.openxmlformats.org/presentationml/2006/main">
+  <p:cSld>
+    <p:spTree>
+      <p:nvGrpSpPr>
+        <p:cNvPr id="1" name=""/>
+        <p:cNvGrpSpPr/>
+        <p:nvPr/>
+      </p:nvGrpSpPr>
+      <p:grpSpPr>
+        <a:xfrm>
+          <a:off x="0" y="0"/>
+          <a:ext cx="0" cy="0"/>
+          <a:chOff x="0" y="0"/>
+          <a:chExt cx="0" cy="0"/>
+        </a:xfrm>
+      </p:grpSpPr>
+      <p:sp>
+        <p:nvSpPr>
+          <p:cNvPr id="2" name="Titolo 1"/>
+          <p:cNvSpPr>
+            <a:spLocks noGrp="1"/>
+          </p:cNvSpPr>
+          <p:nvPr>
+            <p:ph type="title"/>
+          </p:nvPr>
+        </p:nvSpPr>
+        <p:spPr/>
+        <p:txBody>
+          <a:bodyPr/>
+          <a:lstStyle/>
+          <a:p>
+            <a:r>
+              <a:rPr lang="it-IT" dirty="0" smtClean="0"/>
+              <a:t>Domande e richieste</a:t>
+            </a:r>
+            <a:endParaRPr lang="it-IT" dirty="0"/>
+          </a:p>
+        </p:txBody>
+      </p:sp>
+      <p:sp>
+        <p:nvSpPr>
+          <p:cNvPr id="3" name="Segnaposto contenuto 2"/>
+          <p:cNvSpPr>
+            <a:spLocks noGrp="1"/>
+          </p:cNvSpPr>
+          <p:nvPr>
+            <p:ph idx="1"/>
+          </p:nvPr>
+        </p:nvSpPr>
+        <p:spPr/>
+        <p:txBody>
+          <a:bodyPr/>
+          <a:lstStyle/>
+          <a:p>
+            <a:r>
+              <a:rPr lang="it-IT" dirty="0" smtClean="0"/>
+              <a:t>Contenuti da inserire nel sito</a:t>
+            </a:r>
+          </a:p>
+          <a:p>
+            <a:r>
+              <a:rPr lang="it-IT" dirty="0" smtClean="0"/>
+              <a:t>Eventuale modifica grafica o menù</a:t>
+            </a:r>
+          </a:p>
+          <a:p>
+            <a:r>
+              <a:rPr lang="it-IT" dirty="0" smtClean="0"/>
+              <a:t>Eventuali aggiunte/rimozioni funzionalità</a:t>
+            </a:r>
+          </a:p>
+          <a:p>
+            <a:r>
+              <a:rPr lang="it-IT" dirty="0" smtClean="0"/>
+              <a:t>Data di consegna</a:t>
+            </a:r>
+          </a:p>
+          <a:p>
+            <a:endParaRPr lang="it-IT" dirty="0"/>
+          </a:p>
+        </p:txBody>
+      </p:sp>
+      <p:pic>
+        <p:nvPicPr>
+          <p:cNvPr id="4" name="Immagine 3"/>
+          <p:cNvPicPr>
+            <a:picLocks noChangeAspect="1"/>
+          </p:cNvPicPr>
+          <p:nvPr/>
+        </p:nvPicPr>
+        <p:blipFill>
+          <a:blip r:embed="rId2"/>
+          <a:stretch>
+            <a:fillRect/>
+          </a:stretch>
+        </p:blipFill>
+        <p:spPr>
+          <a:xfrm>
+            <a:off x="4109637" y="5578765"/>
+            <a:ext cx="679730" cy="849663"/>
+          </a:xfrm>
+          <a:prstGeom prst="rect">
+            <a:avLst/>
+          </a:prstGeom>
+        </p:spPr>
+      </p:pic>
+    </p:spTree>
+    <p:extLst>
+      <p:ext uri="{BB962C8B-B14F-4D97-AF65-F5344CB8AC3E}">
+        <p14:creationId xmlns:p14="http://schemas.microsoft.com/office/powerpoint/2010/main" val="1797570164"/>
+      </p:ext>
+    </p:extLst>
+  </p:cSld>
+  <p:clrMapOvr>
+    <a:masterClrMapping/>
+  </p:clrMapOvr>
+</p:sld>
+</file>
+
+<file path=ppt/slides/slide11.xml><?xml version="1.0" encoding="utf-8"?>
+<p:sld xmlns:a="http://schemas.openxmlformats.org/drawingml/2006/main" xmlns:r="http://schemas.openxmlformats.org/officeDocument/2006/relationships" xmlns:p="http://schemas.openxmlformats.org/presentationml/2006/main">
+  <p:cSld>
+    <p:spTree>
+      <p:nvGrpSpPr>
+        <p:cNvPr id="1" name=""/>
+        <p:cNvGrpSpPr/>
+        <p:nvPr/>
+      </p:nvGrpSpPr>
+      <p:grpSpPr>
+        <a:xfrm>
+          <a:off x="0" y="0"/>
+          <a:ext cx="0" cy="0"/>
+          <a:chOff x="0" y="0"/>
+          <a:chExt cx="0" cy="0"/>
+        </a:xfrm>
+      </p:grpSpPr>
+      <p:sp>
+        <p:nvSpPr>
+          <p:cNvPr id="2" name="Titolo 1"/>
+          <p:cNvSpPr>
+            <a:spLocks noGrp="1"/>
+          </p:cNvSpPr>
+          <p:nvPr>
+            <p:ph type="title"/>
+          </p:nvPr>
+        </p:nvSpPr>
+        <p:spPr>
+          <a:xfrm>
+            <a:off x="457200" y="2848854"/>
+            <a:ext cx="8229600" cy="1143000"/>
+          </a:xfrm>
+        </p:spPr>
+        <p:txBody>
+          <a:bodyPr/>
+          <a:lstStyle/>
+          <a:p>
+            <a:r>
+              <a:rPr lang="it-IT" i="1" dirty="0" smtClean="0"/>
+              <a:t>Demo</a:t>
+            </a:r>
+            <a:endParaRPr lang="it-IT" i="1" dirty="0"/>
+          </a:p>
+        </p:txBody>
+      </p:sp>
+    </p:spTree>
+    <p:extLst>
+      <p:ext uri="{BB962C8B-B14F-4D97-AF65-F5344CB8AC3E}">
+        <p14:creationId xmlns:p14="http://schemas.microsoft.com/office/powerpoint/2010/main" val="3811027715"/>
+      </p:ext>
+    </p:extLst>
+  </p:cSld>
+  <p:clrMapOvr>
+    <a:masterClrMapping/>
+  </p:clrMapOvr>
+</p:sld>
+</file>
+
+<file path=ppt/slides/slide2.xml><?xml version="1.0" encoding="utf-8"?>
+<p:sld xmlns:a="http://schemas.openxmlformats.org/drawingml/2006/main" xmlns:r="http://schemas.openxmlformats.org/officeDocument/2006/relationships" xmlns:p="http://schemas.openxmlformats.org/presentationml/2006/main">
+  <p:cSld>
+    <p:spTree>
+      <p:nvGrpSpPr>
+        <p:cNvPr id="1" name=""/>
+        <p:cNvGrpSpPr/>
+        <p:nvPr/>
+      </p:nvGrpSpPr>
+      <p:grpSpPr>
+        <a:xfrm>
+          <a:off x="0" y="0"/>
+          <a:ext cx="0" cy="0"/>
+          <a:chOff x="0" y="0"/>
+          <a:chExt cx="0" cy="0"/>
+        </a:xfrm>
+      </p:grpSpPr>
+      <p:sp>
+        <p:nvSpPr>
+          <p:cNvPr id="2" name="Titolo 1"/>
+          <p:cNvSpPr>
+            <a:spLocks noGrp="1"/>
+          </p:cNvSpPr>
+          <p:nvPr>
+            <p:ph type="title"/>
+          </p:nvPr>
+        </p:nvSpPr>
+        <p:spPr/>
+        <p:txBody>
+          <a:bodyPr/>
+          <a:lstStyle/>
+          <a:p>
+            <a:r>
+              <a:rPr lang="it-IT" dirty="0" smtClean="0"/>
+              <a:t>Grafica</a:t>
+            </a:r>
+            <a:endParaRPr lang="it-IT" dirty="0"/>
+          </a:p>
+        </p:txBody>
+      </p:sp>
+      <p:sp>
+        <p:nvSpPr>
+          <p:cNvPr id="3" name="Segnaposto contenuto 2"/>
+          <p:cNvSpPr>
+            <a:spLocks noGrp="1"/>
+          </p:cNvSpPr>
+          <p:nvPr>
+            <p:ph idx="1"/>
+          </p:nvPr>
+        </p:nvSpPr>
+        <p:spPr/>
+        <p:txBody>
+          <a:bodyPr>
+            <a:normAutofit fontScale="92500" lnSpcReduction="10000"/>
+          </a:bodyPr>
+          <a:lstStyle/>
+          <a:p>
+            <a:pPr marL="0" indent="0">
+              <a:buNone/>
+            </a:pPr>
+            <a:r>
+              <a:rPr lang="it-IT" dirty="0" smtClean="0"/>
+              <a:t>Stile:</a:t>
+            </a:r>
+          </a:p>
+          <a:p>
+            <a:r>
+              <a:rPr lang="it-IT" dirty="0" smtClean="0"/>
+              <a:t>Serio</a:t>
+            </a:r>
+          </a:p>
+          <a:p>
+            <a:r>
+              <a:rPr lang="it-IT" dirty="0" smtClean="0"/>
+              <a:t>Moderno</a:t>
+            </a:r>
+            <a:endParaRPr lang="it-IT" dirty="0" smtClean="0"/>
+          </a:p>
+          <a:p>
+            <a:pPr marL="0" indent="0">
+              <a:buNone/>
+            </a:pPr>
+            <a:r>
+              <a:rPr lang="it-IT" dirty="0" smtClean="0"/>
+              <a:t>Colore primario:</a:t>
+            </a:r>
+          </a:p>
+          <a:p>
+            <a:r>
+              <a:rPr lang="it-IT" dirty="0" smtClean="0"/>
+              <a:t>Blu </a:t>
+            </a:r>
+          </a:p>
+          <a:p>
+            <a:r>
+              <a:rPr lang="it-IT" dirty="0" smtClean="0"/>
+              <a:t>Possibilità di rosso e arancione</a:t>
+            </a:r>
+            <a:endParaRPr lang="it-IT" dirty="0"/>
+          </a:p>
+        </p:txBody>
+      </p:sp>
+      <p:pic>
+        <p:nvPicPr>
+          <p:cNvPr id="4" name="Immagine 3"/>
+          <p:cNvPicPr>
+            <a:picLocks noChangeAspect="1"/>
+          </p:cNvPicPr>
+          <p:nvPr/>
+        </p:nvPicPr>
+        <p:blipFill>
+          <a:blip r:embed="rId2"/>
+          <a:stretch>
+            <a:fillRect/>
+          </a:stretch>
+        </p:blipFill>
+        <p:spPr>
+          <a:xfrm>
+            <a:off x="6307577" y="2901539"/>
+            <a:ext cx="2379223" cy="1323239"/>
+          </a:xfrm>
+          <a:prstGeom prst="roundRect">
+            <a:avLst>
+              <a:gd name="adj" fmla="val 8594"/>
+            </a:avLst>
+          </a:prstGeom>
+          <a:solidFill>
+            <a:srgbClr val="FFFFFF">
+              <a:shade val="85000"/>
+            </a:srgbClr>
+          </a:solidFill>
+          <a:ln>
+            <a:noFill/>
+          </a:ln>
+          <a:effectLst>
+            <a:reflection blurRad="12700" stA="38000" endPos="28000" dist="5000" dir="5400000" sy="-100000" algn="bl" rotWithShape="0"/>
+          </a:effectLst>
+        </p:spPr>
+      </p:pic>
+    </p:spTree>
+    <p:extLst>
+      <p:ext uri="{BB962C8B-B14F-4D97-AF65-F5344CB8AC3E}">
+        <p14:creationId xmlns:p14="http://schemas.microsoft.com/office/powerpoint/2010/main" val="3237319010"/>
+      </p:ext>
+    </p:extLst>
+  </p:cSld>
+  <p:clrMapOvr>
+    <a:masterClrMapping/>
+  </p:clrMapOvr>
+</p:sld>
+</file>
+
+<file path=ppt/slides/slide3.xml><?xml version="1.0" encoding="utf-8"?>
+<p:sld xmlns:a="http://schemas.openxmlformats.org/drawingml/2006/main" xmlns:r="http://schemas.openxmlformats.org/officeDocument/2006/relationships" xmlns:p="http://schemas.openxmlformats.org/presentationml/2006/main">
+  <p:cSld>
+    <p:spTree>
+      <p:nvGrpSpPr>
+        <p:cNvPr id="1" name=""/>
+        <p:cNvGrpSpPr/>
+        <p:nvPr/>
+      </p:nvGrpSpPr>
+      <p:grpSpPr>
+        <a:xfrm>
+          <a:off x="0" y="0"/>
+          <a:ext cx="0" cy="0"/>
+          <a:chOff x="0" y="0"/>
+          <a:chExt cx="0" cy="0"/>
+        </a:xfrm>
+      </p:grpSpPr>
+      <p:sp>
+        <p:nvSpPr>
+          <p:cNvPr id="2" name="Titolo 1"/>
+          <p:cNvSpPr>
+            <a:spLocks noGrp="1"/>
+          </p:cNvSpPr>
+          <p:nvPr>
+            <p:ph type="title"/>
+          </p:nvPr>
+        </p:nvSpPr>
+        <p:spPr/>
+        <p:txBody>
+          <a:bodyPr>
+            <a:normAutofit fontScale="90000"/>
+          </a:bodyPr>
+          <a:lstStyle/>
+          <a:p>
+            <a:r>
+              <a:rPr lang="it-IT" dirty="0" smtClean="0"/>
+              <a:t>Scelta di organizzazione dei contenuti</a:t>
+            </a:r>
+            <a:endParaRPr lang="it-IT" dirty="0"/>
+          </a:p>
+        </p:txBody>
+      </p:sp>
+      <p:sp>
+        <p:nvSpPr>
+          <p:cNvPr id="3" name="Segnaposto contenuto 2"/>
+          <p:cNvSpPr>
+            <a:spLocks noGrp="1"/>
+          </p:cNvSpPr>
+          <p:nvPr>
+            <p:ph idx="1"/>
+          </p:nvPr>
+        </p:nvSpPr>
+        <p:spPr/>
+        <p:txBody>
+          <a:bodyPr>
+            <a:normAutofit fontScale="47500" lnSpcReduction="20000"/>
+          </a:bodyPr>
+          <a:lstStyle/>
+          <a:p>
+            <a:pPr marL="0" indent="0">
+              <a:buNone/>
+            </a:pPr>
+            <a:r>
+              <a:rPr lang="it-IT" dirty="0" smtClean="0"/>
+              <a:t>Menù:</a:t>
+            </a:r>
+          </a:p>
+          <a:p>
+            <a:r>
+              <a:rPr lang="it-IT" dirty="0" smtClean="0"/>
+              <a:t>Top-menù</a:t>
+            </a:r>
+          </a:p>
+          <a:p>
+            <a:r>
+              <a:rPr lang="it-IT" dirty="0" smtClean="0"/>
+              <a:t>Bottom-menù</a:t>
+            </a:r>
+          </a:p>
+          <a:p>
+            <a:pPr marL="0" indent="0">
+              <a:buNone/>
+            </a:pPr>
+            <a:r>
+              <a:rPr lang="it-IT" dirty="0" smtClean="0"/>
+              <a:t>Entrambi comprendono le seguenti macro-voci:</a:t>
+            </a:r>
+          </a:p>
+          <a:p>
+            <a:r>
+              <a:rPr lang="it-IT" dirty="0" smtClean="0"/>
+              <a:t>Su di noi</a:t>
+            </a:r>
+          </a:p>
+          <a:p>
+            <a:r>
+              <a:rPr lang="it-IT" dirty="0" smtClean="0"/>
+              <a:t>L’associazione</a:t>
+            </a:r>
+          </a:p>
+          <a:p>
+            <a:r>
+              <a:rPr lang="it-IT" dirty="0" smtClean="0"/>
+              <a:t>Novità</a:t>
+            </a:r>
+          </a:p>
+          <a:p>
+            <a:r>
+              <a:rPr lang="it-IT" dirty="0" smtClean="0"/>
+              <a:t>Sostienici</a:t>
+            </a:r>
+          </a:p>
+          <a:p>
+            <a:r>
+              <a:rPr lang="it-IT" dirty="0" smtClean="0"/>
+              <a:t>Interagisci con noi</a:t>
+            </a:r>
+          </a:p>
+          <a:p>
+            <a:r>
+              <a:rPr lang="it-IT" dirty="0" smtClean="0"/>
+              <a:t>Contatti</a:t>
+            </a:r>
+          </a:p>
+          <a:p>
+            <a:pPr marL="0" indent="0">
+              <a:buNone/>
+            </a:pPr>
+            <a:endParaRPr lang="it-IT" dirty="0" smtClean="0"/>
+          </a:p>
+          <a:p>
+            <a:pPr marL="0" indent="0">
+              <a:buNone/>
+            </a:pPr>
+            <a:r>
+              <a:rPr lang="it-IT" i="1" dirty="0" smtClean="0"/>
+              <a:t>Entrambi i menù sono presenti su tutte le pagine.</a:t>
+            </a:r>
+            <a:endParaRPr lang="it-IT" i="1" dirty="0"/>
+          </a:p>
+        </p:txBody>
+      </p:sp>
+    </p:spTree>
+    <p:extLst>
+      <p:ext uri="{BB962C8B-B14F-4D97-AF65-F5344CB8AC3E}">
+        <p14:creationId xmlns:p14="http://schemas.microsoft.com/office/powerpoint/2010/main" val="1659968720"/>
+      </p:ext>
+    </p:extLst>
+  </p:cSld>
+  <p:clrMapOvr>
+    <a:masterClrMapping/>
+  </p:clrMapOvr>
+</p:sld>
+</file>
+
+<file path=ppt/slides/slide4.xml><?xml version="1.0" encoding="utf-8"?>
+<p:sld xmlns:a="http://schemas.openxmlformats.org/drawingml/2006/main" xmlns:r="http://schemas.openxmlformats.org/officeDocument/2006/relationships" xmlns:p="http://schemas.openxmlformats.org/presentationml/2006/main">
+  <p:cSld>
+    <p:spTree>
+      <p:nvGrpSpPr>
+        <p:cNvPr id="1" name=""/>
+        <p:cNvGrpSpPr/>
+        <p:nvPr/>
+      </p:nvGrpSpPr>
+      <p:grpSpPr>
+        <a:xfrm>
+          <a:off x="0" y="0"/>
+          <a:ext cx="0" cy="0"/>
+          <a:chOff x="0" y="0"/>
+          <a:chExt cx="0" cy="0"/>
+        </a:xfrm>
+      </p:grpSpPr>
+      <p:sp>
+        <p:nvSpPr>
+          <p:cNvPr id="2" name="Titolo 1"/>
+          <p:cNvSpPr>
+            <a:spLocks noGrp="1"/>
+          </p:cNvSpPr>
+          <p:nvPr>
+            <p:ph type="title"/>
+          </p:nvPr>
+        </p:nvSpPr>
+        <p:spPr/>
+        <p:txBody>
+          <a:bodyPr/>
+          <a:lstStyle/>
+          <a:p>
+            <a:r>
+              <a:rPr lang="it-IT" dirty="0" smtClean="0"/>
+              <a:t>Social</a:t>
+            </a:r>
+            <a:endParaRPr lang="it-IT" dirty="0"/>
+          </a:p>
+        </p:txBody>
+      </p:sp>
+      <p:sp>
+        <p:nvSpPr>
+          <p:cNvPr id="3" name="Segnaposto contenuto 2"/>
+          <p:cNvSpPr>
+            <a:spLocks noGrp="1"/>
+          </p:cNvSpPr>
+          <p:nvPr>
+            <p:ph idx="1"/>
+          </p:nvPr>
+        </p:nvSpPr>
+        <p:spPr/>
+        <p:txBody>
+          <a:bodyPr/>
+          <a:lstStyle/>
+          <a:p>
+            <a:pPr marL="0" indent="0">
+              <a:buNone/>
+            </a:pPr>
+            <a:r>
+              <a:rPr lang="it-IT" dirty="0" smtClean="0"/>
+              <a:t>Su ogni pagina sono presenti lateralmente delle icone di connessione  ai social:</a:t>
+            </a:r>
+          </a:p>
+          <a:p>
+            <a:r>
+              <a:rPr lang="it-IT" dirty="0" err="1" smtClean="0"/>
+              <a:t>Facebook</a:t>
+            </a:r>
+            <a:endParaRPr lang="it-IT" dirty="0" smtClean="0"/>
+          </a:p>
+          <a:p>
+            <a:r>
+              <a:rPr lang="it-IT" dirty="0" err="1" smtClean="0"/>
+              <a:t>Twitter</a:t>
+            </a:r>
+            <a:endParaRPr lang="it-IT" dirty="0" smtClean="0"/>
+          </a:p>
+          <a:p>
+            <a:r>
+              <a:rPr lang="it-IT" dirty="0" smtClean="0"/>
+              <a:t>Possibilità di ulteriori social</a:t>
+            </a:r>
+            <a:endParaRPr lang="it-IT" dirty="0"/>
+          </a:p>
+        </p:txBody>
+      </p:sp>
+      <p:pic>
+        <p:nvPicPr>
+          <p:cNvPr id="5" name="Immagine 4"/>
+          <p:cNvPicPr>
+            <a:picLocks noChangeAspect="1"/>
+          </p:cNvPicPr>
+          <p:nvPr/>
+        </p:nvPicPr>
+        <p:blipFill>
+          <a:blip r:embed="rId2"/>
+          <a:stretch>
+            <a:fillRect/>
+          </a:stretch>
+        </p:blipFill>
+        <p:spPr>
+          <a:xfrm>
+            <a:off x="6901960" y="3290549"/>
+            <a:ext cx="1537680" cy="1399037"/>
+          </a:xfrm>
+          <a:prstGeom prst="rect">
+            <a:avLst/>
+          </a:prstGeom>
+        </p:spPr>
+      </p:pic>
+    </p:spTree>
+    <p:extLst>
+      <p:ext uri="{BB962C8B-B14F-4D97-AF65-F5344CB8AC3E}">
+        <p14:creationId xmlns:p14="http://schemas.microsoft.com/office/powerpoint/2010/main" val="2394777575"/>
+      </p:ext>
+    </p:extLst>
+  </p:cSld>
+  <p:clrMapOvr>
+    <a:masterClrMapping/>
+  </p:clrMapOvr>
+</p:sld>
+</file>
+
+<file path=ppt/slides/slide5.xml><?xml version="1.0" encoding="utf-8"?>
+<p:sld xmlns:a="http://schemas.openxmlformats.org/drawingml/2006/main" xmlns:r="http://schemas.openxmlformats.org/officeDocument/2006/relationships" xmlns:p="http://schemas.openxmlformats.org/presentationml/2006/main">
+  <p:cSld>
+    <p:spTree>
+      <p:nvGrpSpPr>
+        <p:cNvPr id="1" name=""/>
+        <p:cNvGrpSpPr/>
+        <p:nvPr/>
+      </p:nvGrpSpPr>
+      <p:grpSpPr>
+        <a:xfrm>
+          <a:off x="0" y="0"/>
+          <a:ext cx="0" cy="0"/>
+          <a:chOff x="0" y="0"/>
+          <a:chExt cx="0" cy="0"/>
+        </a:xfrm>
+      </p:grpSpPr>
+      <p:sp>
+        <p:nvSpPr>
+          <p:cNvPr id="2" name="Titolo 1"/>
+          <p:cNvSpPr>
+            <a:spLocks noGrp="1"/>
+          </p:cNvSpPr>
+          <p:nvPr>
+            <p:ph type="title"/>
+          </p:nvPr>
+        </p:nvSpPr>
+        <p:spPr>
+          <a:xfrm>
+            <a:off x="515304" y="2855944"/>
+            <a:ext cx="8229600" cy="1143000"/>
+          </a:xfrm>
+        </p:spPr>
+        <p:txBody>
+          <a:bodyPr/>
+          <a:lstStyle/>
+          <a:p>
+            <a:r>
+              <a:rPr lang="it-IT" dirty="0" smtClean="0"/>
+              <a:t>Categorizzazioni</a:t>
+            </a:r>
+            <a:endParaRPr lang="it-IT" dirty="0"/>
+          </a:p>
+        </p:txBody>
+      </p:sp>
+    </p:spTree>
+    <p:extLst>
+      <p:ext uri="{BB962C8B-B14F-4D97-AF65-F5344CB8AC3E}">
+        <p14:creationId xmlns:p14="http://schemas.microsoft.com/office/powerpoint/2010/main" val="522881243"/>
+      </p:ext>
+    </p:extLst>
+  </p:cSld>
+  <p:clrMapOvr>
+    <a:masterClrMapping/>
+  </p:clrMapOvr>
+</p:sld>
+</file>
+
+<file path=ppt/slides/slide6.xml><?xml version="1.0" encoding="utf-8"?>
+<p:sld xmlns:a="http://schemas.openxmlformats.org/drawingml/2006/main" xmlns:r="http://schemas.openxmlformats.org/officeDocument/2006/relationships" xmlns:p="http://schemas.openxmlformats.org/presentationml/2006/main">
+  <p:cSld>
+    <p:spTree>
+      <p:nvGrpSpPr>
+        <p:cNvPr id="1" name=""/>
+        <p:cNvGrpSpPr/>
+        <p:nvPr/>
+      </p:nvGrpSpPr>
+      <p:grpSpPr>
+        <a:xfrm>
+          <a:off x="0" y="0"/>
+          <a:ext cx="0" cy="0"/>
+          <a:chOff x="0" y="0"/>
+          <a:chExt cx="0" cy="0"/>
+        </a:xfrm>
+      </p:grpSpPr>
+      <p:sp>
+        <p:nvSpPr>
+          <p:cNvPr id="2" name="Titolo 1"/>
+          <p:cNvSpPr>
+            <a:spLocks noGrp="1"/>
+          </p:cNvSpPr>
+          <p:nvPr>
+            <p:ph type="title"/>
+          </p:nvPr>
+        </p:nvSpPr>
+        <p:spPr/>
+        <p:txBody>
+          <a:bodyPr/>
+          <a:lstStyle/>
+          <a:p>
+            <a:r>
+              <a:rPr lang="it-IT" dirty="0"/>
+              <a:t>A</a:t>
+            </a:r>
+            <a:r>
+              <a:rPr lang="it-IT" dirty="0" smtClean="0"/>
+              <a:t>rticoli</a:t>
+            </a:r>
+            <a:endParaRPr lang="it-IT" dirty="0"/>
+          </a:p>
+        </p:txBody>
+      </p:sp>
+      <p:sp>
+        <p:nvSpPr>
+          <p:cNvPr id="3" name="Segnaposto contenuto 2"/>
+          <p:cNvSpPr>
+            <a:spLocks noGrp="1"/>
+          </p:cNvSpPr>
+          <p:nvPr>
+            <p:ph idx="1"/>
+          </p:nvPr>
+        </p:nvSpPr>
+        <p:spPr/>
+        <p:txBody>
+          <a:bodyPr>
+            <a:normAutofit fontScale="70000" lnSpcReduction="20000"/>
+          </a:bodyPr>
+          <a:lstStyle/>
+          <a:p>
+            <a:pPr marL="0" indent="0">
+              <a:buNone/>
+            </a:pPr>
+            <a:r>
+              <a:rPr lang="it-IT" dirty="0" smtClean="0"/>
+              <a:t>Vi sono due tipi di tipologie articoli:</a:t>
+            </a:r>
+          </a:p>
+          <a:p>
+            <a:r>
+              <a:rPr lang="it-IT" dirty="0" smtClean="0"/>
+              <a:t>Default-site (es. chi siamo?)</a:t>
+            </a:r>
+          </a:p>
+          <a:p>
+            <a:r>
+              <a:rPr lang="it-IT" dirty="0" smtClean="0"/>
+              <a:t>News (articoli che compariranno in home)</a:t>
+            </a:r>
+          </a:p>
+          <a:p>
+            <a:endParaRPr lang="it-IT" dirty="0"/>
+          </a:p>
+          <a:p>
+            <a:pPr marL="0" indent="0">
+              <a:buNone/>
+            </a:pPr>
+            <a:endParaRPr lang="it-IT" dirty="0" smtClean="0"/>
+          </a:p>
+          <a:p>
+            <a:pPr marL="0" indent="0">
+              <a:buNone/>
+            </a:pPr>
+            <a:endParaRPr lang="it-IT" dirty="0"/>
+          </a:p>
+          <a:p>
+            <a:pPr marL="0" indent="0">
+              <a:buNone/>
+            </a:pPr>
+            <a:endParaRPr lang="it-IT" i="1" dirty="0" smtClean="0"/>
+          </a:p>
+          <a:p>
+            <a:pPr marL="0" indent="0">
+              <a:buNone/>
+            </a:pPr>
+            <a:r>
+              <a:rPr lang="it-IT" i="1" dirty="0" smtClean="0"/>
+              <a:t>Possibilità di aggiungerne altre per particolari esigenze.</a:t>
+            </a:r>
+          </a:p>
+          <a:p>
+            <a:endParaRPr lang="it-IT" dirty="0"/>
+          </a:p>
+        </p:txBody>
+      </p:sp>
+    </p:spTree>
+    <p:extLst>
+      <p:ext uri="{BB962C8B-B14F-4D97-AF65-F5344CB8AC3E}">
+        <p14:creationId xmlns:p14="http://schemas.microsoft.com/office/powerpoint/2010/main" val="855459367"/>
+      </p:ext>
+    </p:extLst>
+  </p:cSld>
+  <p:clrMapOvr>
+    <a:masterClrMapping/>
+  </p:clrMapOvr>
+</p:sld>
+</file>
+
+<file path=ppt/slides/slide7.xml><?xml version="1.0" encoding="utf-8"?>
+<p:sld xmlns:a="http://schemas.openxmlformats.org/drawingml/2006/main" xmlns:r="http://schemas.openxmlformats.org/officeDocument/2006/relationships" xmlns:p="http://schemas.openxmlformats.org/presentationml/2006/main">
+  <p:cSld>
+    <p:spTree>
+      <p:nvGrpSpPr>
+        <p:cNvPr id="1" name=""/>
+        <p:cNvGrpSpPr/>
+        <p:nvPr/>
+      </p:nvGrpSpPr>
+      <p:grpSpPr>
+        <a:xfrm>
+          <a:off x="0" y="0"/>
+          <a:ext cx="0" cy="0"/>
+          <a:chOff x="0" y="0"/>
+          <a:chExt cx="0" cy="0"/>
+        </a:xfrm>
+      </p:grpSpPr>
+      <p:sp>
+        <p:nvSpPr>
+          <p:cNvPr id="2" name="Titolo 1"/>
+          <p:cNvSpPr>
+            <a:spLocks noGrp="1"/>
+          </p:cNvSpPr>
+          <p:nvPr>
+            <p:ph type="title"/>
+          </p:nvPr>
+        </p:nvSpPr>
+        <p:spPr/>
+        <p:txBody>
+          <a:bodyPr/>
+          <a:lstStyle/>
+          <a:p>
+            <a:r>
+              <a:rPr lang="it-IT" dirty="0"/>
+              <a:t>I</a:t>
+            </a:r>
+            <a:r>
+              <a:rPr lang="it-IT" dirty="0" smtClean="0"/>
+              <a:t>ncontri</a:t>
+            </a:r>
+            <a:endParaRPr lang="it-IT" dirty="0"/>
+          </a:p>
+        </p:txBody>
+      </p:sp>
+      <p:sp>
+        <p:nvSpPr>
+          <p:cNvPr id="3" name="Segnaposto contenuto 2"/>
+          <p:cNvSpPr>
+            <a:spLocks noGrp="1"/>
+          </p:cNvSpPr>
+          <p:nvPr>
+            <p:ph idx="1"/>
+          </p:nvPr>
+        </p:nvSpPr>
+        <p:spPr/>
+        <p:txBody>
+          <a:bodyPr>
+            <a:normAutofit fontScale="85000" lnSpcReduction="20000"/>
+          </a:bodyPr>
+          <a:lstStyle/>
+          <a:p>
+            <a:pPr marL="0" indent="0">
+              <a:buNone/>
+            </a:pPr>
+            <a:r>
+              <a:rPr lang="it-IT" dirty="0" smtClean="0"/>
+              <a:t>Vi sono due tipologie di incontri:</a:t>
+            </a:r>
+          </a:p>
+          <a:p>
+            <a:r>
+              <a:rPr lang="it-IT" dirty="0" smtClean="0"/>
+              <a:t>Eventi</a:t>
+            </a:r>
+          </a:p>
+          <a:p>
+            <a:r>
+              <a:rPr lang="it-IT" dirty="0" smtClean="0"/>
+              <a:t>Convegni</a:t>
+            </a:r>
+          </a:p>
+          <a:p>
+            <a:endParaRPr lang="it-IT" dirty="0"/>
+          </a:p>
+          <a:p>
+            <a:pPr marL="0" indent="0">
+              <a:buNone/>
+            </a:pPr>
+            <a:endParaRPr lang="it-IT" dirty="0" smtClean="0"/>
+          </a:p>
+          <a:p>
+            <a:pPr marL="0" indent="0">
+              <a:buNone/>
+            </a:pPr>
+            <a:r>
+              <a:rPr lang="it-IT" i="1" dirty="0" smtClean="0"/>
+              <a:t>Possibilità di aggiungerne altri, ogni tipologia è gestita in modo </a:t>
+            </a:r>
+            <a:r>
+              <a:rPr lang="it-IT" i="1" dirty="0" err="1" smtClean="0"/>
+              <a:t>diversficato</a:t>
+            </a:r>
+            <a:r>
+              <a:rPr lang="it-IT" i="1" dirty="0" smtClean="0"/>
+              <a:t>.</a:t>
+            </a:r>
+            <a:endParaRPr lang="it-IT" i="1" dirty="0"/>
+          </a:p>
+        </p:txBody>
+      </p:sp>
+      <p:pic>
+        <p:nvPicPr>
+          <p:cNvPr id="4" name="Immagine 3"/>
+          <p:cNvPicPr>
+            <a:picLocks noChangeAspect="1"/>
+          </p:cNvPicPr>
+          <p:nvPr/>
+        </p:nvPicPr>
+        <p:blipFill>
+          <a:blip r:embed="rId2"/>
+          <a:stretch>
+            <a:fillRect/>
+          </a:stretch>
+        </p:blipFill>
+        <p:spPr>
+          <a:xfrm>
+            <a:off x="79186" y="457200"/>
+            <a:ext cx="996087" cy="989447"/>
+          </a:xfrm>
+          <a:prstGeom prst="rect">
+            <a:avLst/>
+          </a:prstGeom>
+        </p:spPr>
+      </p:pic>
+    </p:spTree>
+    <p:extLst>
+      <p:ext uri="{BB962C8B-B14F-4D97-AF65-F5344CB8AC3E}">
+        <p14:creationId xmlns:p14="http://schemas.microsoft.com/office/powerpoint/2010/main" val="3951703777"/>
+      </p:ext>
+    </p:extLst>
+  </p:cSld>
+  <p:clrMapOvr>
+    <a:masterClrMapping/>
+  </p:clrMapOvr>
+</p:sld>
+</file>
+
+<file path=ppt/slides/slide8.xml><?xml version="1.0" encoding="utf-8"?>
+<p:sld xmlns:a="http://schemas.openxmlformats.org/drawingml/2006/main" xmlns:r="http://schemas.openxmlformats.org/officeDocument/2006/relationships" xmlns:p="http://schemas.openxmlformats.org/presentationml/2006/main">
+  <p:cSld>
+    <p:spTree>
+      <p:nvGrpSpPr>
+        <p:cNvPr id="1" name=""/>
+        <p:cNvGrpSpPr/>
+        <p:nvPr/>
+      </p:nvGrpSpPr>
+      <p:grpSpPr>
+        <a:xfrm>
+          <a:off x="0" y="0"/>
+          <a:ext cx="0" cy="0"/>
+          <a:chOff x="0" y="0"/>
+          <a:chExt cx="0" cy="0"/>
+        </a:xfrm>
+      </p:grpSpPr>
+      <p:sp>
+        <p:nvSpPr>
+          <p:cNvPr id="2" name="Titolo 1"/>
+          <p:cNvSpPr>
+            <a:spLocks noGrp="1"/>
+          </p:cNvSpPr>
+          <p:nvPr>
+            <p:ph type="title"/>
+          </p:nvPr>
+        </p:nvSpPr>
+        <p:spPr/>
+        <p:txBody>
+          <a:bodyPr/>
+          <a:lstStyle/>
+          <a:p>
+            <a:r>
+              <a:rPr lang="it-IT" dirty="0"/>
+              <a:t>U</a:t>
+            </a:r>
+            <a:r>
+              <a:rPr lang="it-IT" dirty="0" smtClean="0"/>
+              <a:t>tenti</a:t>
+            </a:r>
+            <a:endParaRPr lang="it-IT" dirty="0"/>
+          </a:p>
+        </p:txBody>
+      </p:sp>
+      <p:sp>
+        <p:nvSpPr>
+          <p:cNvPr id="3" name="Segnaposto contenuto 2"/>
+          <p:cNvSpPr>
+            <a:spLocks noGrp="1"/>
+          </p:cNvSpPr>
+          <p:nvPr>
+            <p:ph idx="1"/>
+          </p:nvPr>
+        </p:nvSpPr>
+        <p:spPr/>
+        <p:txBody>
+          <a:bodyPr>
+            <a:normAutofit fontScale="85000" lnSpcReduction="20000"/>
+          </a:bodyPr>
+          <a:lstStyle/>
+          <a:p>
+            <a:pPr marL="0" indent="0">
+              <a:buNone/>
+            </a:pPr>
+            <a:r>
+              <a:rPr lang="it-IT" dirty="0" smtClean="0"/>
+              <a:t>Vi sono due tipologie di utenti:</a:t>
+            </a:r>
+          </a:p>
+          <a:p>
+            <a:r>
+              <a:rPr lang="it-IT" dirty="0" err="1" smtClean="0"/>
+              <a:t>Admin</a:t>
+            </a:r>
+            <a:r>
+              <a:rPr lang="it-IT" dirty="0" smtClean="0"/>
+              <a:t> (controllo totale)</a:t>
+            </a:r>
+          </a:p>
+          <a:p>
+            <a:r>
+              <a:rPr lang="it-IT" dirty="0" smtClean="0"/>
+              <a:t>User (controllo limitato)</a:t>
+            </a:r>
+          </a:p>
+          <a:p>
+            <a:endParaRPr lang="it-IT" dirty="0"/>
+          </a:p>
+          <a:p>
+            <a:pPr marL="0" indent="0">
+              <a:buNone/>
+            </a:pPr>
+            <a:endParaRPr lang="it-IT" dirty="0" smtClean="0"/>
+          </a:p>
+          <a:p>
+            <a:pPr marL="0" indent="0">
+              <a:buNone/>
+            </a:pPr>
+            <a:r>
+              <a:rPr lang="it-IT" i="1" dirty="0" smtClean="0"/>
+              <a:t>Su richiesta è possibile effettuare creazioni di utenti con particolari limitazioni e/o privilegi.</a:t>
+            </a:r>
+            <a:endParaRPr lang="it-IT" i="1" dirty="0"/>
+          </a:p>
+        </p:txBody>
+      </p:sp>
+      <p:pic>
+        <p:nvPicPr>
+          <p:cNvPr id="4" name="Immagine 3"/>
+          <p:cNvPicPr>
+            <a:picLocks noChangeAspect="1"/>
+          </p:cNvPicPr>
+          <p:nvPr/>
+        </p:nvPicPr>
+        <p:blipFill>
+          <a:blip r:embed="rId2"/>
+          <a:stretch>
+            <a:fillRect/>
+          </a:stretch>
+        </p:blipFill>
+        <p:spPr>
+          <a:xfrm>
+            <a:off x="368182" y="614904"/>
+            <a:ext cx="1002037" cy="663320"/>
+          </a:xfrm>
+          <a:prstGeom prst="rect">
+            <a:avLst/>
+          </a:prstGeom>
+        </p:spPr>
+      </p:pic>
+    </p:spTree>
+    <p:extLst>
+      <p:ext uri="{BB962C8B-B14F-4D97-AF65-F5344CB8AC3E}">
+        <p14:creationId xmlns:p14="http://schemas.microsoft.com/office/powerpoint/2010/main" val="2508808584"/>
+      </p:ext>
+    </p:extLst>
+  </p:cSld>
+  <p:clrMapOvr>
+    <a:masterClrMapping/>
+  </p:clrMapOvr>
+</p:sld>
+</file>
+
+<file path=ppt/slides/slide9.xml><?xml version="1.0" encoding="utf-8"?>
+<p:sld xmlns:a="http://schemas.openxmlformats.org/drawingml/2006/main" xmlns:r="http://schemas.openxmlformats.org/officeDocument/2006/relationships" xmlns:p="http://schemas.openxmlformats.org/presentationml/2006/main">
+  <p:cSld>
+    <p:spTree>
+      <p:nvGrpSpPr>
+        <p:cNvPr id="1" name=""/>
+        <p:cNvGrpSpPr/>
+        <p:nvPr/>
+      </p:nvGrpSpPr>
+      <p:grpSpPr>
+        <a:xfrm>
+          <a:off x="0" y="0"/>
+          <a:ext cx="0" cy="0"/>
+          <a:chOff x="0" y="0"/>
+          <a:chExt cx="0" cy="0"/>
+        </a:xfrm>
+      </p:grpSpPr>
+      <p:sp>
+        <p:nvSpPr>
+          <p:cNvPr id="2" name="Titolo 1"/>
+          <p:cNvSpPr>
+            <a:spLocks noGrp="1"/>
+          </p:cNvSpPr>
+          <p:nvPr>
+            <p:ph type="title"/>
+          </p:nvPr>
+        </p:nvSpPr>
+        <p:spPr/>
+        <p:txBody>
+          <a:bodyPr/>
+          <a:lstStyle/>
+          <a:p>
+            <a:r>
+              <a:rPr lang="it-IT" dirty="0" err="1" smtClean="0"/>
+              <a:t>Aggiornabilità</a:t>
+            </a:r>
+            <a:r>
+              <a:rPr lang="it-IT" dirty="0" smtClean="0"/>
+              <a:t> del sito</a:t>
+            </a:r>
+            <a:endParaRPr lang="it-IT" dirty="0"/>
+          </a:p>
+        </p:txBody>
+      </p:sp>
+      <p:sp>
+        <p:nvSpPr>
+          <p:cNvPr id="3" name="Segnaposto contenuto 2"/>
+          <p:cNvSpPr>
+            <a:spLocks noGrp="1"/>
+          </p:cNvSpPr>
+          <p:nvPr>
+            <p:ph idx="1"/>
+          </p:nvPr>
+        </p:nvSpPr>
+        <p:spPr/>
+        <p:txBody>
+          <a:bodyPr/>
+          <a:lstStyle/>
+          <a:p>
+            <a:pPr marL="0" indent="0">
+              <a:buNone/>
+            </a:pPr>
+            <a:r>
+              <a:rPr lang="it-IT" dirty="0" smtClean="0"/>
+              <a:t>Ogni articolo, evento, album fotografico è facilmente aggiornabile e modificabile.</a:t>
+            </a:r>
+            <a:endParaRPr lang="it-IT" dirty="0"/>
+          </a:p>
+        </p:txBody>
+      </p:sp>
+      <p:pic>
+        <p:nvPicPr>
+          <p:cNvPr id="4" name="Immagine 3"/>
+          <p:cNvPicPr>
+            <a:picLocks noChangeAspect="1"/>
+          </p:cNvPicPr>
+          <p:nvPr/>
+        </p:nvPicPr>
+        <p:blipFill>
+          <a:blip r:embed="rId2"/>
+          <a:stretch>
+            <a:fillRect/>
+          </a:stretch>
+        </p:blipFill>
+        <p:spPr>
+          <a:xfrm>
+            <a:off x="457200" y="556648"/>
+            <a:ext cx="920779" cy="920779"/>
+          </a:xfrm>
+          <a:prstGeom prst="rect">
+            <a:avLst/>
+          </a:prstGeom>
+        </p:spPr>
+      </p:pic>
+    </p:spTree>
+    <p:extLst>
+      <p:ext uri="{BB962C8B-B14F-4D97-AF65-F5344CB8AC3E}">
+        <p14:creationId xmlns:p14="http://schemas.microsoft.com/office/powerpoint/2010/main" val="3792630446"/>
       </p:ext>
     </p:extLst>
   </p:cSld>

</xml_diff>